<commit_message>
Adjust sequence in WAGI slide
</commit_message>
<xml_diff>
--- a/2022/XMasDev/WebAssembly-XMASDEV2022.pptx
+++ b/2022/XMasDev/WebAssembly-XMASDEV2022.pptx
@@ -240,7 +240,7 @@
           <a:p>
             <a:fld id="{727297A4-9A49-8F45-8BB8-FCFEA36B5158}" type="slidenum">
               <a:rPr lang="it-IT" smtClean="0"/>
-              <a:t>‹#›</a:t>
+              <a:t>‹N›</a:t>
             </a:fld>
             <a:endParaRPr lang="it-IT" dirty="0"/>
           </a:p>
@@ -408,7 +408,7 @@
           <a:p>
             <a:fld id="{727297A4-9A49-8F45-8BB8-FCFEA36B5158}" type="slidenum">
               <a:rPr lang="it-IT" smtClean="0"/>
-              <a:t>‹#›</a:t>
+              <a:t>‹N›</a:t>
             </a:fld>
             <a:endParaRPr lang="it-IT"/>
           </a:p>
@@ -501,7 +501,7 @@
           <a:p>
             <a:fld id="{727297A4-9A49-8F45-8BB8-FCFEA36B5158}" type="slidenum">
               <a:rPr lang="it-IT" smtClean="0"/>
-              <a:t>‹#›</a:t>
+              <a:t>‹N›</a:t>
             </a:fld>
             <a:endParaRPr lang="it-IT"/>
           </a:p>
@@ -772,7 +772,7 @@
           <a:p>
             <a:fld id="{727297A4-9A49-8F45-8BB8-FCFEA36B5158}" type="slidenum">
               <a:rPr lang="it-IT" smtClean="0"/>
-              <a:t>‹#›</a:t>
+              <a:t>‹N›</a:t>
             </a:fld>
             <a:endParaRPr lang="it-IT"/>
           </a:p>
@@ -1048,7 +1048,7 @@
           <a:p>
             <a:fld id="{727297A4-9A49-8F45-8BB8-FCFEA36B5158}" type="slidenum">
               <a:rPr lang="it-IT" smtClean="0"/>
-              <a:t>‹#›</a:t>
+              <a:t>‹N›</a:t>
             </a:fld>
             <a:endParaRPr lang="it-IT"/>
           </a:p>
@@ -1201,7 +1201,7 @@
           <a:p>
             <a:fld id="{727297A4-9A49-8F45-8BB8-FCFEA36B5158}" type="slidenum">
               <a:rPr lang="it-IT" smtClean="0"/>
-              <a:t>‹#›</a:t>
+              <a:t>‹N›</a:t>
             </a:fld>
             <a:endParaRPr lang="it-IT"/>
           </a:p>
@@ -1364,7 +1364,7 @@
           <a:p>
             <a:fld id="{727297A4-9A49-8F45-8BB8-FCFEA36B5158}" type="slidenum">
               <a:rPr lang="it-IT" smtClean="0"/>
-              <a:t>‹#›</a:t>
+              <a:t>‹N›</a:t>
             </a:fld>
             <a:endParaRPr lang="it-IT"/>
           </a:p>
@@ -1598,7 +1598,7 @@
           <a:p>
             <a:fld id="{727297A4-9A49-8F45-8BB8-FCFEA36B5158}" type="slidenum">
               <a:rPr lang="it-IT" smtClean="0"/>
-              <a:t>‹#›</a:t>
+              <a:t>‹N›</a:t>
             </a:fld>
             <a:endParaRPr lang="it-IT"/>
           </a:p>
@@ -2578,7 +2578,7 @@
           <a:p>
             <a:fld id="{727297A4-9A49-8F45-8BB8-FCFEA36B5158}" type="slidenum">
               <a:rPr lang="it-IT" smtClean="0"/>
-              <a:t>‹#›</a:t>
+              <a:t>‹N›</a:t>
             </a:fld>
             <a:endParaRPr lang="it-IT"/>
           </a:p>
@@ -2843,7 +2843,7 @@
           <a:p>
             <a:fld id="{727297A4-9A49-8F45-8BB8-FCFEA36B5158}" type="slidenum">
               <a:rPr lang="it-IT" smtClean="0"/>
-              <a:t>‹#›</a:t>
+              <a:t>‹N›</a:t>
             </a:fld>
             <a:endParaRPr lang="it-IT"/>
           </a:p>
@@ -3038,7 +3038,7 @@
           <a:p>
             <a:fld id="{727297A4-9A49-8F45-8BB8-FCFEA36B5158}" type="slidenum">
               <a:rPr lang="it-IT" smtClean="0"/>
-              <a:t>‹#›</a:t>
+              <a:t>‹N›</a:t>
             </a:fld>
             <a:endParaRPr lang="it-IT"/>
           </a:p>
@@ -3395,7 +3395,7 @@
           <a:p>
             <a:fld id="{727297A4-9A49-8F45-8BB8-FCFEA36B5158}" type="slidenum">
               <a:rPr lang="it-IT" smtClean="0"/>
-              <a:t>‹#›</a:t>
+              <a:t>‹N›</a:t>
             </a:fld>
             <a:endParaRPr lang="it-IT"/>
           </a:p>
@@ -3684,7 +3684,7 @@
           <a:p>
             <a:fld id="{727297A4-9A49-8F45-8BB8-FCFEA36B5158}" type="slidenum">
               <a:rPr lang="it-IT" smtClean="0"/>
-              <a:t>‹#›</a:t>
+              <a:t>‹N›</a:t>
             </a:fld>
             <a:endParaRPr lang="it-IT"/>
           </a:p>
@@ -6804,7 +6804,7 @@
                                           </p:stCondLst>
                                         </p:cTn>
                                         <p:tgtEl>
-                                          <p:spTgt spid="13"/>
+                                          <p:spTgt spid="15"/>
                                         </p:tgtEl>
                                         <p:attrNameLst>
                                           <p:attrName>style.visibility</p:attrName>
@@ -6849,7 +6849,7 @@
                                           </p:stCondLst>
                                         </p:cTn>
                                         <p:tgtEl>
-                                          <p:spTgt spid="14"/>
+                                          <p:spTgt spid="13"/>
                                         </p:tgtEl>
                                         <p:attrNameLst>
                                           <p:attrName>style.visibility</p:attrName>
@@ -6862,21 +6862,39 @@
                                   </p:childTnLst>
                                 </p:cTn>
                               </p:par>
+                            </p:childTnLst>
+                          </p:cTn>
+                        </p:par>
+                      </p:childTnLst>
+                    </p:cTn>
+                  </p:par>
+                  <p:par>
+                    <p:cTn id="25" fill="hold">
+                      <p:stCondLst>
+                        <p:cond delay="indefinite"/>
+                      </p:stCondLst>
+                      <p:childTnLst>
+                        <p:par>
+                          <p:cTn id="26" fill="hold">
+                            <p:stCondLst>
+                              <p:cond delay="0"/>
+                            </p:stCondLst>
+                            <p:childTnLst>
                               <p:par>
-                                <p:cTn id="25" presetID="1" presetClass="entr" presetSubtype="0" fill="hold" nodeType="withEffect">
+                                <p:cTn id="27" presetID="1" presetClass="entr" presetSubtype="0" fill="hold" nodeType="clickEffect">
                                   <p:stCondLst>
                                     <p:cond delay="0"/>
                                   </p:stCondLst>
                                   <p:childTnLst>
                                     <p:set>
                                       <p:cBhvr>
-                                        <p:cTn id="26" dur="1" fill="hold">
+                                        <p:cTn id="28" dur="1" fill="hold">
                                           <p:stCondLst>
                                             <p:cond delay="0"/>
                                           </p:stCondLst>
                                         </p:cTn>
                                         <p:tgtEl>
-                                          <p:spTgt spid="15"/>
+                                          <p:spTgt spid="14"/>
                                         </p:tgtEl>
                                         <p:attrNameLst>
                                           <p:attrName>style.visibility</p:attrName>

</xml_diff>